<commit_message>
created new fpga_controller module sperated with original named "fpga_only_controller"
</commit_message>
<xml_diff>
--- a/dev/fpga/통신구조구상도/통신구조.pptx
+++ b/dev/fpga/통신구조구상도/통신구조.pptx
@@ -7,6 +7,7 @@
   <p:sldIdLst>
     <p:sldId id="256" r:id="rId2"/>
     <p:sldId id="258" r:id="rId3"/>
+    <p:sldId id="259" r:id="rId4"/>
   </p:sldIdLst>
   <p:sldSz cx="12192000" cy="6858000"/>
   <p:notesSz cx="6858000" cy="9144000"/>
@@ -105,6 +106,11 @@
       </a:defRPr>
     </a:lvl9pPr>
   </p:defaultTextStyle>
+  <p:extLst>
+    <p:ext uri="{EFAFB233-063F-42B5-8137-9DF3F51BA10A}">
+      <p15:sldGuideLst xmlns:p15="http://schemas.microsoft.com/office/powerpoint/2012/main"/>
+    </p:ext>
+  </p:extLst>
 </p:presentation>
 </file>
 
@@ -255,7 +261,7 @@
           <a:p>
             <a:fld id="{F14D9079-434D-4AD0-BECB-31635DDC2C1D}" type="datetimeFigureOut">
               <a:rPr lang="ko-KR" altLang="en-US" smtClean="0"/>
-              <a:t>2024-03-21</a:t>
+              <a:t>2024-03-28</a:t>
             </a:fld>
             <a:endParaRPr lang="ko-KR" altLang="en-US"/>
           </a:p>
@@ -453,7 +459,7 @@
           <a:p>
             <a:fld id="{F14D9079-434D-4AD0-BECB-31635DDC2C1D}" type="datetimeFigureOut">
               <a:rPr lang="ko-KR" altLang="en-US" smtClean="0"/>
-              <a:t>2024-03-21</a:t>
+              <a:t>2024-03-28</a:t>
             </a:fld>
             <a:endParaRPr lang="ko-KR" altLang="en-US"/>
           </a:p>
@@ -661,7 +667,7 @@
           <a:p>
             <a:fld id="{F14D9079-434D-4AD0-BECB-31635DDC2C1D}" type="datetimeFigureOut">
               <a:rPr lang="ko-KR" altLang="en-US" smtClean="0"/>
-              <a:t>2024-03-21</a:t>
+              <a:t>2024-03-28</a:t>
             </a:fld>
             <a:endParaRPr lang="ko-KR" altLang="en-US"/>
           </a:p>
@@ -859,7 +865,7 @@
           <a:p>
             <a:fld id="{F14D9079-434D-4AD0-BECB-31635DDC2C1D}" type="datetimeFigureOut">
               <a:rPr lang="ko-KR" altLang="en-US" smtClean="0"/>
-              <a:t>2024-03-21</a:t>
+              <a:t>2024-03-28</a:t>
             </a:fld>
             <a:endParaRPr lang="ko-KR" altLang="en-US"/>
           </a:p>
@@ -1134,7 +1140,7 @@
           <a:p>
             <a:fld id="{F14D9079-434D-4AD0-BECB-31635DDC2C1D}" type="datetimeFigureOut">
               <a:rPr lang="ko-KR" altLang="en-US" smtClean="0"/>
-              <a:t>2024-03-21</a:t>
+              <a:t>2024-03-28</a:t>
             </a:fld>
             <a:endParaRPr lang="ko-KR" altLang="en-US"/>
           </a:p>
@@ -1399,7 +1405,7 @@
           <a:p>
             <a:fld id="{F14D9079-434D-4AD0-BECB-31635DDC2C1D}" type="datetimeFigureOut">
               <a:rPr lang="ko-KR" altLang="en-US" smtClean="0"/>
-              <a:t>2024-03-21</a:t>
+              <a:t>2024-03-28</a:t>
             </a:fld>
             <a:endParaRPr lang="ko-KR" altLang="en-US"/>
           </a:p>
@@ -1811,7 +1817,7 @@
           <a:p>
             <a:fld id="{F14D9079-434D-4AD0-BECB-31635DDC2C1D}" type="datetimeFigureOut">
               <a:rPr lang="ko-KR" altLang="en-US" smtClean="0"/>
-              <a:t>2024-03-21</a:t>
+              <a:t>2024-03-28</a:t>
             </a:fld>
             <a:endParaRPr lang="ko-KR" altLang="en-US"/>
           </a:p>
@@ -1952,7 +1958,7 @@
           <a:p>
             <a:fld id="{F14D9079-434D-4AD0-BECB-31635DDC2C1D}" type="datetimeFigureOut">
               <a:rPr lang="ko-KR" altLang="en-US" smtClean="0"/>
-              <a:t>2024-03-21</a:t>
+              <a:t>2024-03-28</a:t>
             </a:fld>
             <a:endParaRPr lang="ko-KR" altLang="en-US"/>
           </a:p>
@@ -2065,7 +2071,7 @@
           <a:p>
             <a:fld id="{F14D9079-434D-4AD0-BECB-31635DDC2C1D}" type="datetimeFigureOut">
               <a:rPr lang="ko-KR" altLang="en-US" smtClean="0"/>
-              <a:t>2024-03-21</a:t>
+              <a:t>2024-03-28</a:t>
             </a:fld>
             <a:endParaRPr lang="ko-KR" altLang="en-US"/>
           </a:p>
@@ -2376,7 +2382,7 @@
           <a:p>
             <a:fld id="{F14D9079-434D-4AD0-BECB-31635DDC2C1D}" type="datetimeFigureOut">
               <a:rPr lang="ko-KR" altLang="en-US" smtClean="0"/>
-              <a:t>2024-03-21</a:t>
+              <a:t>2024-03-28</a:t>
             </a:fld>
             <a:endParaRPr lang="ko-KR" altLang="en-US"/>
           </a:p>
@@ -2664,7 +2670,7 @@
           <a:p>
             <a:fld id="{F14D9079-434D-4AD0-BECB-31635DDC2C1D}" type="datetimeFigureOut">
               <a:rPr lang="ko-KR" altLang="en-US" smtClean="0"/>
-              <a:t>2024-03-21</a:t>
+              <a:t>2024-03-28</a:t>
             </a:fld>
             <a:endParaRPr lang="ko-KR" altLang="en-US"/>
           </a:p>
@@ -2905,7 +2911,7 @@
           <a:p>
             <a:fld id="{F14D9079-434D-4AD0-BECB-31635DDC2C1D}" type="datetimeFigureOut">
               <a:rPr lang="ko-KR" altLang="en-US" smtClean="0"/>
-              <a:t>2024-03-21</a:t>
+              <a:t>2024-03-28</a:t>
             </a:fld>
             <a:endParaRPr lang="ko-KR" altLang="en-US"/>
           </a:p>
@@ -4241,7 +4247,7 @@
         <p:spPr>
           <a:xfrm>
             <a:off x="470263" y="2177521"/>
-            <a:ext cx="11016343" cy="4801314"/>
+            <a:ext cx="11016343" cy="4524315"/>
           </a:xfrm>
           <a:prstGeom prst="rect">
             <a:avLst/>
@@ -4274,58 +4280,15 @@
             </a:pPr>
             <a:r>
               <a:rPr lang="ko-KR" altLang="en-US" dirty="0"/>
-              <a:t>컴퓨터 </a:t>
+              <a:t>컴퓨터가 </a:t>
             </a:r>
             <a:r>
               <a:rPr lang="en-US" altLang="ko-KR" dirty="0"/>
-              <a:t>-&gt; FPGA </a:t>
-            </a:r>
-            <a:r>
-              <a:rPr lang="en-US" altLang="ko-KR" dirty="0" err="1"/>
-              <a:t>rx</a:t>
-            </a:r>
-            <a:r>
-              <a:rPr lang="en-US" altLang="ko-KR" dirty="0"/>
-              <a:t> = 0  DMD </a:t>
+              <a:t>DMD </a:t>
             </a:r>
             <a:r>
               <a:rPr lang="ko-KR" altLang="en-US" dirty="0"/>
-              <a:t>작동 시작했음</a:t>
-            </a:r>
-            <a:endParaRPr lang="en-US" altLang="ko-KR" dirty="0"/>
-          </a:p>
-          <a:p>
-            <a:r>
-              <a:rPr lang="en-US" altLang="ko-KR" dirty="0"/>
-              <a:t>    FPGA -&gt; </a:t>
-            </a:r>
-            <a:r>
-              <a:rPr lang="ko-KR" altLang="en-US" dirty="0"/>
-              <a:t>컴퓨터 </a:t>
-            </a:r>
-            <a:r>
-              <a:rPr lang="en-US" altLang="ko-KR" dirty="0" err="1"/>
-              <a:t>tx</a:t>
-            </a:r>
-            <a:r>
-              <a:rPr lang="en-US" altLang="ko-KR" dirty="0"/>
-              <a:t> = 1 </a:t>
-            </a:r>
-            <a:r>
-              <a:rPr lang="ko-KR" altLang="en-US" dirty="0" err="1"/>
-              <a:t>ㅇㅋ</a:t>
-            </a:r>
-            <a:r>
-              <a:rPr lang="ko-KR" altLang="en-US" dirty="0"/>
-              <a:t> </a:t>
-            </a:r>
-            <a:r>
-              <a:rPr lang="ko-KR" altLang="en-US" dirty="0" err="1"/>
-              <a:t>카운팅</a:t>
-            </a:r>
-            <a:r>
-              <a:rPr lang="ko-KR" altLang="en-US" dirty="0"/>
-              <a:t> 시작</a:t>
+              <a:t>켜면 작동시작</a:t>
             </a:r>
             <a:endParaRPr lang="en-US" altLang="ko-KR" dirty="0"/>
           </a:p>
@@ -4732,6 +4695,1740 @@
     <p:extLst>
       <p:ext uri="{BB962C8B-B14F-4D97-AF65-F5344CB8AC3E}">
         <p14:creationId xmlns:p14="http://schemas.microsoft.com/office/powerpoint/2010/main" val="579187421"/>
+      </p:ext>
+    </p:extLst>
+  </p:cSld>
+  <p:clrMapOvr>
+    <a:masterClrMapping/>
+  </p:clrMapOvr>
+</p:sld>
+</file>
+
+<file path=ppt/slides/slide3.xml><?xml version="1.0" encoding="utf-8"?>
+<p:sld xmlns:a="http://schemas.openxmlformats.org/drawingml/2006/main" xmlns:r="http://schemas.openxmlformats.org/officeDocument/2006/relationships" xmlns:p="http://schemas.openxmlformats.org/presentationml/2006/main">
+  <p:cSld>
+    <p:spTree>
+      <p:nvGrpSpPr>
+        <p:cNvPr id="1" name=""/>
+        <p:cNvGrpSpPr/>
+        <p:nvPr/>
+      </p:nvGrpSpPr>
+      <p:grpSpPr>
+        <a:xfrm>
+          <a:off x="0" y="0"/>
+          <a:ext cx="0" cy="0"/>
+          <a:chOff x="0" y="0"/>
+          <a:chExt cx="0" cy="0"/>
+        </a:xfrm>
+      </p:grpSpPr>
+      <p:cxnSp>
+        <p:nvCxnSpPr>
+          <p:cNvPr id="12" name="연결선: 꺾임 11">
+            <a:extLst>
+              <a:ext uri="{FF2B5EF4-FFF2-40B4-BE49-F238E27FC236}">
+                <a16:creationId xmlns:a16="http://schemas.microsoft.com/office/drawing/2014/main" id="{AC3C15DD-0EBA-7297-C42D-4CE856AAFECA}"/>
+              </a:ext>
+            </a:extLst>
+          </p:cNvPr>
+          <p:cNvCxnSpPr>
+            <a:cxnSpLocks/>
+          </p:cNvCxnSpPr>
+          <p:nvPr/>
+        </p:nvCxnSpPr>
+        <p:spPr>
+          <a:xfrm>
+            <a:off x="1362890" y="1001487"/>
+            <a:ext cx="296092" cy="261257"/>
+          </a:xfrm>
+          <a:prstGeom prst="bentConnector3">
+            <a:avLst/>
+          </a:prstGeom>
+        </p:spPr>
+        <p:style>
+          <a:lnRef idx="2">
+            <a:schemeClr val="accent1"/>
+          </a:lnRef>
+          <a:fillRef idx="0">
+            <a:schemeClr val="accent1"/>
+          </a:fillRef>
+          <a:effectRef idx="1">
+            <a:schemeClr val="accent1"/>
+          </a:effectRef>
+          <a:fontRef idx="minor">
+            <a:schemeClr val="tx1"/>
+          </a:fontRef>
+        </p:style>
+      </p:cxnSp>
+      <p:cxnSp>
+        <p:nvCxnSpPr>
+          <p:cNvPr id="15" name="연결선: 꺾임 14">
+            <a:extLst>
+              <a:ext uri="{FF2B5EF4-FFF2-40B4-BE49-F238E27FC236}">
+                <a16:creationId xmlns:a16="http://schemas.microsoft.com/office/drawing/2014/main" id="{B2672C1B-2DF5-97E3-84B4-9004102709F2}"/>
+              </a:ext>
+            </a:extLst>
+          </p:cNvPr>
+          <p:cNvCxnSpPr>
+            <a:cxnSpLocks/>
+          </p:cNvCxnSpPr>
+          <p:nvPr/>
+        </p:nvCxnSpPr>
+        <p:spPr>
+          <a:xfrm flipV="1">
+            <a:off x="1066798" y="1001486"/>
+            <a:ext cx="296092" cy="261257"/>
+          </a:xfrm>
+          <a:prstGeom prst="bentConnector3">
+            <a:avLst/>
+          </a:prstGeom>
+        </p:spPr>
+        <p:style>
+          <a:lnRef idx="2">
+            <a:schemeClr val="accent1"/>
+          </a:lnRef>
+          <a:fillRef idx="0">
+            <a:schemeClr val="accent1"/>
+          </a:fillRef>
+          <a:effectRef idx="1">
+            <a:schemeClr val="accent1"/>
+          </a:effectRef>
+          <a:fontRef idx="minor">
+            <a:schemeClr val="tx1"/>
+          </a:fontRef>
+        </p:style>
+      </p:cxnSp>
+      <p:cxnSp>
+        <p:nvCxnSpPr>
+          <p:cNvPr id="16" name="연결선: 꺾임 15">
+            <a:extLst>
+              <a:ext uri="{FF2B5EF4-FFF2-40B4-BE49-F238E27FC236}">
+                <a16:creationId xmlns:a16="http://schemas.microsoft.com/office/drawing/2014/main" id="{B60DD018-1B27-5DA9-E5CC-A5DE665A597C}"/>
+              </a:ext>
+            </a:extLst>
+          </p:cNvPr>
+          <p:cNvCxnSpPr>
+            <a:cxnSpLocks/>
+          </p:cNvCxnSpPr>
+          <p:nvPr/>
+        </p:nvCxnSpPr>
+        <p:spPr>
+          <a:xfrm>
+            <a:off x="1937656" y="1001486"/>
+            <a:ext cx="296092" cy="261257"/>
+          </a:xfrm>
+          <a:prstGeom prst="bentConnector3">
+            <a:avLst/>
+          </a:prstGeom>
+        </p:spPr>
+        <p:style>
+          <a:lnRef idx="2">
+            <a:schemeClr val="accent1"/>
+          </a:lnRef>
+          <a:fillRef idx="0">
+            <a:schemeClr val="accent1"/>
+          </a:fillRef>
+          <a:effectRef idx="1">
+            <a:schemeClr val="accent1"/>
+          </a:effectRef>
+          <a:fontRef idx="minor">
+            <a:schemeClr val="tx1"/>
+          </a:fontRef>
+        </p:style>
+      </p:cxnSp>
+      <p:cxnSp>
+        <p:nvCxnSpPr>
+          <p:cNvPr id="17" name="연결선: 꺾임 16">
+            <a:extLst>
+              <a:ext uri="{FF2B5EF4-FFF2-40B4-BE49-F238E27FC236}">
+                <a16:creationId xmlns:a16="http://schemas.microsoft.com/office/drawing/2014/main" id="{01A83A38-1033-C192-B937-1810F145B836}"/>
+              </a:ext>
+            </a:extLst>
+          </p:cNvPr>
+          <p:cNvCxnSpPr>
+            <a:cxnSpLocks/>
+          </p:cNvCxnSpPr>
+          <p:nvPr/>
+        </p:nvCxnSpPr>
+        <p:spPr>
+          <a:xfrm flipV="1">
+            <a:off x="1650273" y="1001485"/>
+            <a:ext cx="296092" cy="261257"/>
+          </a:xfrm>
+          <a:prstGeom prst="bentConnector3">
+            <a:avLst/>
+          </a:prstGeom>
+        </p:spPr>
+        <p:style>
+          <a:lnRef idx="2">
+            <a:schemeClr val="accent1"/>
+          </a:lnRef>
+          <a:fillRef idx="0">
+            <a:schemeClr val="accent1"/>
+          </a:fillRef>
+          <a:effectRef idx="1">
+            <a:schemeClr val="accent1"/>
+          </a:effectRef>
+          <a:fontRef idx="minor">
+            <a:schemeClr val="tx1"/>
+          </a:fontRef>
+        </p:style>
+      </p:cxnSp>
+      <p:cxnSp>
+        <p:nvCxnSpPr>
+          <p:cNvPr id="18" name="연결선: 꺾임 17">
+            <a:extLst>
+              <a:ext uri="{FF2B5EF4-FFF2-40B4-BE49-F238E27FC236}">
+                <a16:creationId xmlns:a16="http://schemas.microsoft.com/office/drawing/2014/main" id="{EBA3E114-7B10-EE9A-0AB2-4435CD4E5392}"/>
+              </a:ext>
+            </a:extLst>
+          </p:cNvPr>
+          <p:cNvCxnSpPr>
+            <a:cxnSpLocks/>
+          </p:cNvCxnSpPr>
+          <p:nvPr/>
+        </p:nvCxnSpPr>
+        <p:spPr>
+          <a:xfrm>
+            <a:off x="2525485" y="1001486"/>
+            <a:ext cx="296092" cy="261257"/>
+          </a:xfrm>
+          <a:prstGeom prst="bentConnector3">
+            <a:avLst/>
+          </a:prstGeom>
+        </p:spPr>
+        <p:style>
+          <a:lnRef idx="2">
+            <a:schemeClr val="accent1"/>
+          </a:lnRef>
+          <a:fillRef idx="0">
+            <a:schemeClr val="accent1"/>
+          </a:fillRef>
+          <a:effectRef idx="1">
+            <a:schemeClr val="accent1"/>
+          </a:effectRef>
+          <a:fontRef idx="minor">
+            <a:schemeClr val="tx1"/>
+          </a:fontRef>
+        </p:style>
+      </p:cxnSp>
+      <p:cxnSp>
+        <p:nvCxnSpPr>
+          <p:cNvPr id="19" name="연결선: 꺾임 18">
+            <a:extLst>
+              <a:ext uri="{FF2B5EF4-FFF2-40B4-BE49-F238E27FC236}">
+                <a16:creationId xmlns:a16="http://schemas.microsoft.com/office/drawing/2014/main" id="{4CF665C7-E838-36C4-5B13-720F8ED40834}"/>
+              </a:ext>
+            </a:extLst>
+          </p:cNvPr>
+          <p:cNvCxnSpPr>
+            <a:cxnSpLocks/>
+          </p:cNvCxnSpPr>
+          <p:nvPr/>
+        </p:nvCxnSpPr>
+        <p:spPr>
+          <a:xfrm flipV="1">
+            <a:off x="2229393" y="1001485"/>
+            <a:ext cx="296092" cy="261257"/>
+          </a:xfrm>
+          <a:prstGeom prst="bentConnector3">
+            <a:avLst/>
+          </a:prstGeom>
+        </p:spPr>
+        <p:style>
+          <a:lnRef idx="2">
+            <a:schemeClr val="accent1"/>
+          </a:lnRef>
+          <a:fillRef idx="0">
+            <a:schemeClr val="accent1"/>
+          </a:fillRef>
+          <a:effectRef idx="1">
+            <a:schemeClr val="accent1"/>
+          </a:effectRef>
+          <a:fontRef idx="minor">
+            <a:schemeClr val="tx1"/>
+          </a:fontRef>
+        </p:style>
+      </p:cxnSp>
+      <p:cxnSp>
+        <p:nvCxnSpPr>
+          <p:cNvPr id="20" name="연결선: 꺾임 19">
+            <a:extLst>
+              <a:ext uri="{FF2B5EF4-FFF2-40B4-BE49-F238E27FC236}">
+                <a16:creationId xmlns:a16="http://schemas.microsoft.com/office/drawing/2014/main" id="{9B96627E-2BF5-B5D8-B2CF-6CE09766F420}"/>
+              </a:ext>
+            </a:extLst>
+          </p:cNvPr>
+          <p:cNvCxnSpPr>
+            <a:cxnSpLocks/>
+          </p:cNvCxnSpPr>
+          <p:nvPr/>
+        </p:nvCxnSpPr>
+        <p:spPr>
+          <a:xfrm>
+            <a:off x="3100251" y="1001485"/>
+            <a:ext cx="296092" cy="261257"/>
+          </a:xfrm>
+          <a:prstGeom prst="bentConnector3">
+            <a:avLst/>
+          </a:prstGeom>
+        </p:spPr>
+        <p:style>
+          <a:lnRef idx="2">
+            <a:schemeClr val="accent1"/>
+          </a:lnRef>
+          <a:fillRef idx="0">
+            <a:schemeClr val="accent1"/>
+          </a:fillRef>
+          <a:effectRef idx="1">
+            <a:schemeClr val="accent1"/>
+          </a:effectRef>
+          <a:fontRef idx="minor">
+            <a:schemeClr val="tx1"/>
+          </a:fontRef>
+        </p:style>
+      </p:cxnSp>
+      <p:cxnSp>
+        <p:nvCxnSpPr>
+          <p:cNvPr id="21" name="연결선: 꺾임 20">
+            <a:extLst>
+              <a:ext uri="{FF2B5EF4-FFF2-40B4-BE49-F238E27FC236}">
+                <a16:creationId xmlns:a16="http://schemas.microsoft.com/office/drawing/2014/main" id="{011081B3-3F80-0361-6638-37B663148D91}"/>
+              </a:ext>
+            </a:extLst>
+          </p:cNvPr>
+          <p:cNvCxnSpPr>
+            <a:cxnSpLocks/>
+          </p:cNvCxnSpPr>
+          <p:nvPr/>
+        </p:nvCxnSpPr>
+        <p:spPr>
+          <a:xfrm flipV="1">
+            <a:off x="2812868" y="1001484"/>
+            <a:ext cx="296092" cy="261257"/>
+          </a:xfrm>
+          <a:prstGeom prst="bentConnector3">
+            <a:avLst/>
+          </a:prstGeom>
+        </p:spPr>
+        <p:style>
+          <a:lnRef idx="2">
+            <a:schemeClr val="accent1"/>
+          </a:lnRef>
+          <a:fillRef idx="0">
+            <a:schemeClr val="accent1"/>
+          </a:fillRef>
+          <a:effectRef idx="1">
+            <a:schemeClr val="accent1"/>
+          </a:effectRef>
+          <a:fontRef idx="minor">
+            <a:schemeClr val="tx1"/>
+          </a:fontRef>
+        </p:style>
+      </p:cxnSp>
+      <p:cxnSp>
+        <p:nvCxnSpPr>
+          <p:cNvPr id="22" name="연결선: 꺾임 21">
+            <a:extLst>
+              <a:ext uri="{FF2B5EF4-FFF2-40B4-BE49-F238E27FC236}">
+                <a16:creationId xmlns:a16="http://schemas.microsoft.com/office/drawing/2014/main" id="{3ACC5D27-1B16-F197-4FB0-91DF5748C536}"/>
+              </a:ext>
+            </a:extLst>
+          </p:cNvPr>
+          <p:cNvCxnSpPr>
+            <a:cxnSpLocks/>
+          </p:cNvCxnSpPr>
+          <p:nvPr/>
+        </p:nvCxnSpPr>
+        <p:spPr>
+          <a:xfrm>
+            <a:off x="3675019" y="1001486"/>
+            <a:ext cx="296092" cy="261257"/>
+          </a:xfrm>
+          <a:prstGeom prst="bentConnector3">
+            <a:avLst/>
+          </a:prstGeom>
+        </p:spPr>
+        <p:style>
+          <a:lnRef idx="2">
+            <a:schemeClr val="accent1"/>
+          </a:lnRef>
+          <a:fillRef idx="0">
+            <a:schemeClr val="accent1"/>
+          </a:fillRef>
+          <a:effectRef idx="1">
+            <a:schemeClr val="accent1"/>
+          </a:effectRef>
+          <a:fontRef idx="minor">
+            <a:schemeClr val="tx1"/>
+          </a:fontRef>
+        </p:style>
+      </p:cxnSp>
+      <p:cxnSp>
+        <p:nvCxnSpPr>
+          <p:cNvPr id="23" name="연결선: 꺾임 22">
+            <a:extLst>
+              <a:ext uri="{FF2B5EF4-FFF2-40B4-BE49-F238E27FC236}">
+                <a16:creationId xmlns:a16="http://schemas.microsoft.com/office/drawing/2014/main" id="{A55C82FE-4A48-BA3D-3CE2-DBCA3BCCAD53}"/>
+              </a:ext>
+            </a:extLst>
+          </p:cNvPr>
+          <p:cNvCxnSpPr>
+            <a:cxnSpLocks/>
+          </p:cNvCxnSpPr>
+          <p:nvPr/>
+        </p:nvCxnSpPr>
+        <p:spPr>
+          <a:xfrm flipV="1">
+            <a:off x="3378927" y="1001485"/>
+            <a:ext cx="296092" cy="261257"/>
+          </a:xfrm>
+          <a:prstGeom prst="bentConnector3">
+            <a:avLst/>
+          </a:prstGeom>
+        </p:spPr>
+        <p:style>
+          <a:lnRef idx="2">
+            <a:schemeClr val="accent1"/>
+          </a:lnRef>
+          <a:fillRef idx="0">
+            <a:schemeClr val="accent1"/>
+          </a:fillRef>
+          <a:effectRef idx="1">
+            <a:schemeClr val="accent1"/>
+          </a:effectRef>
+          <a:fontRef idx="minor">
+            <a:schemeClr val="tx1"/>
+          </a:fontRef>
+        </p:style>
+      </p:cxnSp>
+      <p:cxnSp>
+        <p:nvCxnSpPr>
+          <p:cNvPr id="24" name="연결선: 꺾임 23">
+            <a:extLst>
+              <a:ext uri="{FF2B5EF4-FFF2-40B4-BE49-F238E27FC236}">
+                <a16:creationId xmlns:a16="http://schemas.microsoft.com/office/drawing/2014/main" id="{FBB2EE7E-D846-C8B4-617D-F168EC611E2A}"/>
+              </a:ext>
+            </a:extLst>
+          </p:cNvPr>
+          <p:cNvCxnSpPr>
+            <a:cxnSpLocks/>
+          </p:cNvCxnSpPr>
+          <p:nvPr/>
+        </p:nvCxnSpPr>
+        <p:spPr>
+          <a:xfrm>
+            <a:off x="4249785" y="1001485"/>
+            <a:ext cx="296092" cy="261257"/>
+          </a:xfrm>
+          <a:prstGeom prst="bentConnector3">
+            <a:avLst/>
+          </a:prstGeom>
+        </p:spPr>
+        <p:style>
+          <a:lnRef idx="2">
+            <a:schemeClr val="accent1"/>
+          </a:lnRef>
+          <a:fillRef idx="0">
+            <a:schemeClr val="accent1"/>
+          </a:fillRef>
+          <a:effectRef idx="1">
+            <a:schemeClr val="accent1"/>
+          </a:effectRef>
+          <a:fontRef idx="minor">
+            <a:schemeClr val="tx1"/>
+          </a:fontRef>
+        </p:style>
+      </p:cxnSp>
+      <p:cxnSp>
+        <p:nvCxnSpPr>
+          <p:cNvPr id="25" name="연결선: 꺾임 24">
+            <a:extLst>
+              <a:ext uri="{FF2B5EF4-FFF2-40B4-BE49-F238E27FC236}">
+                <a16:creationId xmlns:a16="http://schemas.microsoft.com/office/drawing/2014/main" id="{031DA320-2260-FC38-4034-E7D8A852D7C1}"/>
+              </a:ext>
+            </a:extLst>
+          </p:cNvPr>
+          <p:cNvCxnSpPr>
+            <a:cxnSpLocks/>
+          </p:cNvCxnSpPr>
+          <p:nvPr/>
+        </p:nvCxnSpPr>
+        <p:spPr>
+          <a:xfrm flipV="1">
+            <a:off x="3962402" y="1001484"/>
+            <a:ext cx="296092" cy="261257"/>
+          </a:xfrm>
+          <a:prstGeom prst="bentConnector3">
+            <a:avLst/>
+          </a:prstGeom>
+        </p:spPr>
+        <p:style>
+          <a:lnRef idx="2">
+            <a:schemeClr val="accent1"/>
+          </a:lnRef>
+          <a:fillRef idx="0">
+            <a:schemeClr val="accent1"/>
+          </a:fillRef>
+          <a:effectRef idx="1">
+            <a:schemeClr val="accent1"/>
+          </a:effectRef>
+          <a:fontRef idx="minor">
+            <a:schemeClr val="tx1"/>
+          </a:fontRef>
+        </p:style>
+      </p:cxnSp>
+      <p:cxnSp>
+        <p:nvCxnSpPr>
+          <p:cNvPr id="26" name="연결선: 꺾임 25">
+            <a:extLst>
+              <a:ext uri="{FF2B5EF4-FFF2-40B4-BE49-F238E27FC236}">
+                <a16:creationId xmlns:a16="http://schemas.microsoft.com/office/drawing/2014/main" id="{F0F432A9-8A42-D805-B9E1-60FB088AFB4D}"/>
+              </a:ext>
+            </a:extLst>
+          </p:cNvPr>
+          <p:cNvCxnSpPr>
+            <a:cxnSpLocks/>
+          </p:cNvCxnSpPr>
+          <p:nvPr/>
+        </p:nvCxnSpPr>
+        <p:spPr>
+          <a:xfrm>
+            <a:off x="4837614" y="1001485"/>
+            <a:ext cx="296092" cy="261257"/>
+          </a:xfrm>
+          <a:prstGeom prst="bentConnector3">
+            <a:avLst/>
+          </a:prstGeom>
+        </p:spPr>
+        <p:style>
+          <a:lnRef idx="2">
+            <a:schemeClr val="accent1"/>
+          </a:lnRef>
+          <a:fillRef idx="0">
+            <a:schemeClr val="accent1"/>
+          </a:fillRef>
+          <a:effectRef idx="1">
+            <a:schemeClr val="accent1"/>
+          </a:effectRef>
+          <a:fontRef idx="minor">
+            <a:schemeClr val="tx1"/>
+          </a:fontRef>
+        </p:style>
+      </p:cxnSp>
+      <p:cxnSp>
+        <p:nvCxnSpPr>
+          <p:cNvPr id="27" name="연결선: 꺾임 26">
+            <a:extLst>
+              <a:ext uri="{FF2B5EF4-FFF2-40B4-BE49-F238E27FC236}">
+                <a16:creationId xmlns:a16="http://schemas.microsoft.com/office/drawing/2014/main" id="{228821DA-4252-9AD8-FA46-9B1964E88A73}"/>
+              </a:ext>
+            </a:extLst>
+          </p:cNvPr>
+          <p:cNvCxnSpPr>
+            <a:cxnSpLocks/>
+          </p:cNvCxnSpPr>
+          <p:nvPr/>
+        </p:nvCxnSpPr>
+        <p:spPr>
+          <a:xfrm flipV="1">
+            <a:off x="4541522" y="1001484"/>
+            <a:ext cx="296092" cy="261257"/>
+          </a:xfrm>
+          <a:prstGeom prst="bentConnector3">
+            <a:avLst/>
+          </a:prstGeom>
+        </p:spPr>
+        <p:style>
+          <a:lnRef idx="2">
+            <a:schemeClr val="accent1"/>
+          </a:lnRef>
+          <a:fillRef idx="0">
+            <a:schemeClr val="accent1"/>
+          </a:fillRef>
+          <a:effectRef idx="1">
+            <a:schemeClr val="accent1"/>
+          </a:effectRef>
+          <a:fontRef idx="minor">
+            <a:schemeClr val="tx1"/>
+          </a:fontRef>
+        </p:style>
+      </p:cxnSp>
+      <p:cxnSp>
+        <p:nvCxnSpPr>
+          <p:cNvPr id="28" name="연결선: 꺾임 27">
+            <a:extLst>
+              <a:ext uri="{FF2B5EF4-FFF2-40B4-BE49-F238E27FC236}">
+                <a16:creationId xmlns:a16="http://schemas.microsoft.com/office/drawing/2014/main" id="{D924A749-2A61-46B1-9A86-92A389E94EDE}"/>
+              </a:ext>
+            </a:extLst>
+          </p:cNvPr>
+          <p:cNvCxnSpPr>
+            <a:cxnSpLocks/>
+          </p:cNvCxnSpPr>
+          <p:nvPr/>
+        </p:nvCxnSpPr>
+        <p:spPr>
+          <a:xfrm>
+            <a:off x="5412380" y="1001484"/>
+            <a:ext cx="296092" cy="261257"/>
+          </a:xfrm>
+          <a:prstGeom prst="bentConnector3">
+            <a:avLst/>
+          </a:prstGeom>
+        </p:spPr>
+        <p:style>
+          <a:lnRef idx="2">
+            <a:schemeClr val="accent1"/>
+          </a:lnRef>
+          <a:fillRef idx="0">
+            <a:schemeClr val="accent1"/>
+          </a:fillRef>
+          <a:effectRef idx="1">
+            <a:schemeClr val="accent1"/>
+          </a:effectRef>
+          <a:fontRef idx="minor">
+            <a:schemeClr val="tx1"/>
+          </a:fontRef>
+        </p:style>
+      </p:cxnSp>
+      <p:cxnSp>
+        <p:nvCxnSpPr>
+          <p:cNvPr id="29" name="연결선: 꺾임 28">
+            <a:extLst>
+              <a:ext uri="{FF2B5EF4-FFF2-40B4-BE49-F238E27FC236}">
+                <a16:creationId xmlns:a16="http://schemas.microsoft.com/office/drawing/2014/main" id="{DAD1E76F-50E5-793C-A87F-32DAB7470678}"/>
+              </a:ext>
+            </a:extLst>
+          </p:cNvPr>
+          <p:cNvCxnSpPr>
+            <a:cxnSpLocks/>
+          </p:cNvCxnSpPr>
+          <p:nvPr/>
+        </p:nvCxnSpPr>
+        <p:spPr>
+          <a:xfrm flipV="1">
+            <a:off x="5124997" y="1001483"/>
+            <a:ext cx="296092" cy="261257"/>
+          </a:xfrm>
+          <a:prstGeom prst="bentConnector3">
+            <a:avLst/>
+          </a:prstGeom>
+        </p:spPr>
+        <p:style>
+          <a:lnRef idx="2">
+            <a:schemeClr val="accent1"/>
+          </a:lnRef>
+          <a:fillRef idx="0">
+            <a:schemeClr val="accent1"/>
+          </a:fillRef>
+          <a:effectRef idx="1">
+            <a:schemeClr val="accent1"/>
+          </a:effectRef>
+          <a:fontRef idx="minor">
+            <a:schemeClr val="tx1"/>
+          </a:fontRef>
+        </p:style>
+      </p:cxnSp>
+      <p:cxnSp>
+        <p:nvCxnSpPr>
+          <p:cNvPr id="30" name="연결선: 꺾임 29">
+            <a:extLst>
+              <a:ext uri="{FF2B5EF4-FFF2-40B4-BE49-F238E27FC236}">
+                <a16:creationId xmlns:a16="http://schemas.microsoft.com/office/drawing/2014/main" id="{12C3C5F3-BB52-389C-FC65-3E3CDD5353C6}"/>
+              </a:ext>
+            </a:extLst>
+          </p:cNvPr>
+          <p:cNvCxnSpPr>
+            <a:cxnSpLocks/>
+          </p:cNvCxnSpPr>
+          <p:nvPr/>
+        </p:nvCxnSpPr>
+        <p:spPr>
+          <a:xfrm>
+            <a:off x="6004566" y="1001485"/>
+            <a:ext cx="296092" cy="261257"/>
+          </a:xfrm>
+          <a:prstGeom prst="bentConnector3">
+            <a:avLst/>
+          </a:prstGeom>
+        </p:spPr>
+        <p:style>
+          <a:lnRef idx="2">
+            <a:schemeClr val="accent1"/>
+          </a:lnRef>
+          <a:fillRef idx="0">
+            <a:schemeClr val="accent1"/>
+          </a:fillRef>
+          <a:effectRef idx="1">
+            <a:schemeClr val="accent1"/>
+          </a:effectRef>
+          <a:fontRef idx="minor">
+            <a:schemeClr val="tx1"/>
+          </a:fontRef>
+        </p:style>
+      </p:cxnSp>
+      <p:cxnSp>
+        <p:nvCxnSpPr>
+          <p:cNvPr id="31" name="연결선: 꺾임 30">
+            <a:extLst>
+              <a:ext uri="{FF2B5EF4-FFF2-40B4-BE49-F238E27FC236}">
+                <a16:creationId xmlns:a16="http://schemas.microsoft.com/office/drawing/2014/main" id="{1D9CD855-FBBE-5BB0-BC06-22E245B59B05}"/>
+              </a:ext>
+            </a:extLst>
+          </p:cNvPr>
+          <p:cNvCxnSpPr>
+            <a:cxnSpLocks/>
+          </p:cNvCxnSpPr>
+          <p:nvPr/>
+        </p:nvCxnSpPr>
+        <p:spPr>
+          <a:xfrm flipV="1">
+            <a:off x="5708474" y="1001484"/>
+            <a:ext cx="296092" cy="261257"/>
+          </a:xfrm>
+          <a:prstGeom prst="bentConnector3">
+            <a:avLst/>
+          </a:prstGeom>
+        </p:spPr>
+        <p:style>
+          <a:lnRef idx="2">
+            <a:schemeClr val="accent1"/>
+          </a:lnRef>
+          <a:fillRef idx="0">
+            <a:schemeClr val="accent1"/>
+          </a:fillRef>
+          <a:effectRef idx="1">
+            <a:schemeClr val="accent1"/>
+          </a:effectRef>
+          <a:fontRef idx="minor">
+            <a:schemeClr val="tx1"/>
+          </a:fontRef>
+        </p:style>
+      </p:cxnSp>
+      <p:cxnSp>
+        <p:nvCxnSpPr>
+          <p:cNvPr id="32" name="연결선: 꺾임 31">
+            <a:extLst>
+              <a:ext uri="{FF2B5EF4-FFF2-40B4-BE49-F238E27FC236}">
+                <a16:creationId xmlns:a16="http://schemas.microsoft.com/office/drawing/2014/main" id="{31552A21-8871-6354-1ECE-5F7C58321D0A}"/>
+              </a:ext>
+            </a:extLst>
+          </p:cNvPr>
+          <p:cNvCxnSpPr>
+            <a:cxnSpLocks/>
+          </p:cNvCxnSpPr>
+          <p:nvPr/>
+        </p:nvCxnSpPr>
+        <p:spPr>
+          <a:xfrm>
+            <a:off x="6579332" y="1001484"/>
+            <a:ext cx="296092" cy="261257"/>
+          </a:xfrm>
+          <a:prstGeom prst="bentConnector3">
+            <a:avLst/>
+          </a:prstGeom>
+        </p:spPr>
+        <p:style>
+          <a:lnRef idx="2">
+            <a:schemeClr val="accent1"/>
+          </a:lnRef>
+          <a:fillRef idx="0">
+            <a:schemeClr val="accent1"/>
+          </a:fillRef>
+          <a:effectRef idx="1">
+            <a:schemeClr val="accent1"/>
+          </a:effectRef>
+          <a:fontRef idx="minor">
+            <a:schemeClr val="tx1"/>
+          </a:fontRef>
+        </p:style>
+      </p:cxnSp>
+      <p:cxnSp>
+        <p:nvCxnSpPr>
+          <p:cNvPr id="33" name="연결선: 꺾임 32">
+            <a:extLst>
+              <a:ext uri="{FF2B5EF4-FFF2-40B4-BE49-F238E27FC236}">
+                <a16:creationId xmlns:a16="http://schemas.microsoft.com/office/drawing/2014/main" id="{4F1E84A9-29FD-EC81-F0F3-E3BAE93959F8}"/>
+              </a:ext>
+            </a:extLst>
+          </p:cNvPr>
+          <p:cNvCxnSpPr>
+            <a:cxnSpLocks/>
+          </p:cNvCxnSpPr>
+          <p:nvPr/>
+        </p:nvCxnSpPr>
+        <p:spPr>
+          <a:xfrm flipV="1">
+            <a:off x="6291949" y="1001483"/>
+            <a:ext cx="296092" cy="261257"/>
+          </a:xfrm>
+          <a:prstGeom prst="bentConnector3">
+            <a:avLst/>
+          </a:prstGeom>
+        </p:spPr>
+        <p:style>
+          <a:lnRef idx="2">
+            <a:schemeClr val="accent1"/>
+          </a:lnRef>
+          <a:fillRef idx="0">
+            <a:schemeClr val="accent1"/>
+          </a:fillRef>
+          <a:effectRef idx="1">
+            <a:schemeClr val="accent1"/>
+          </a:effectRef>
+          <a:fontRef idx="minor">
+            <a:schemeClr val="tx1"/>
+          </a:fontRef>
+        </p:style>
+      </p:cxnSp>
+      <p:cxnSp>
+        <p:nvCxnSpPr>
+          <p:cNvPr id="34" name="연결선: 꺾임 33">
+            <a:extLst>
+              <a:ext uri="{FF2B5EF4-FFF2-40B4-BE49-F238E27FC236}">
+                <a16:creationId xmlns:a16="http://schemas.microsoft.com/office/drawing/2014/main" id="{7FABF0AC-ABB1-7B32-6136-AB86669C3CA7}"/>
+              </a:ext>
+            </a:extLst>
+          </p:cNvPr>
+          <p:cNvCxnSpPr>
+            <a:cxnSpLocks/>
+          </p:cNvCxnSpPr>
+          <p:nvPr/>
+        </p:nvCxnSpPr>
+        <p:spPr>
+          <a:xfrm>
+            <a:off x="7167161" y="1001484"/>
+            <a:ext cx="296092" cy="261257"/>
+          </a:xfrm>
+          <a:prstGeom prst="bentConnector3">
+            <a:avLst/>
+          </a:prstGeom>
+        </p:spPr>
+        <p:style>
+          <a:lnRef idx="2">
+            <a:schemeClr val="accent1"/>
+          </a:lnRef>
+          <a:fillRef idx="0">
+            <a:schemeClr val="accent1"/>
+          </a:fillRef>
+          <a:effectRef idx="1">
+            <a:schemeClr val="accent1"/>
+          </a:effectRef>
+          <a:fontRef idx="minor">
+            <a:schemeClr val="tx1"/>
+          </a:fontRef>
+        </p:style>
+      </p:cxnSp>
+      <p:cxnSp>
+        <p:nvCxnSpPr>
+          <p:cNvPr id="35" name="연결선: 꺾임 34">
+            <a:extLst>
+              <a:ext uri="{FF2B5EF4-FFF2-40B4-BE49-F238E27FC236}">
+                <a16:creationId xmlns:a16="http://schemas.microsoft.com/office/drawing/2014/main" id="{727B2E5C-5E2A-A46A-3B1C-DDE2984320D7}"/>
+              </a:ext>
+            </a:extLst>
+          </p:cNvPr>
+          <p:cNvCxnSpPr>
+            <a:cxnSpLocks/>
+          </p:cNvCxnSpPr>
+          <p:nvPr/>
+        </p:nvCxnSpPr>
+        <p:spPr>
+          <a:xfrm flipV="1">
+            <a:off x="6871069" y="1001483"/>
+            <a:ext cx="296092" cy="261257"/>
+          </a:xfrm>
+          <a:prstGeom prst="bentConnector3">
+            <a:avLst/>
+          </a:prstGeom>
+        </p:spPr>
+        <p:style>
+          <a:lnRef idx="2">
+            <a:schemeClr val="accent1"/>
+          </a:lnRef>
+          <a:fillRef idx="0">
+            <a:schemeClr val="accent1"/>
+          </a:fillRef>
+          <a:effectRef idx="1">
+            <a:schemeClr val="accent1"/>
+          </a:effectRef>
+          <a:fontRef idx="minor">
+            <a:schemeClr val="tx1"/>
+          </a:fontRef>
+        </p:style>
+      </p:cxnSp>
+      <p:cxnSp>
+        <p:nvCxnSpPr>
+          <p:cNvPr id="36" name="연결선: 꺾임 35">
+            <a:extLst>
+              <a:ext uri="{FF2B5EF4-FFF2-40B4-BE49-F238E27FC236}">
+                <a16:creationId xmlns:a16="http://schemas.microsoft.com/office/drawing/2014/main" id="{23481C97-B5DC-0A23-1532-468B3B734CE5}"/>
+              </a:ext>
+            </a:extLst>
+          </p:cNvPr>
+          <p:cNvCxnSpPr>
+            <a:cxnSpLocks/>
+          </p:cNvCxnSpPr>
+          <p:nvPr/>
+        </p:nvCxnSpPr>
+        <p:spPr>
+          <a:xfrm>
+            <a:off x="7741927" y="1001483"/>
+            <a:ext cx="296092" cy="261257"/>
+          </a:xfrm>
+          <a:prstGeom prst="bentConnector3">
+            <a:avLst/>
+          </a:prstGeom>
+        </p:spPr>
+        <p:style>
+          <a:lnRef idx="2">
+            <a:schemeClr val="accent1"/>
+          </a:lnRef>
+          <a:fillRef idx="0">
+            <a:schemeClr val="accent1"/>
+          </a:fillRef>
+          <a:effectRef idx="1">
+            <a:schemeClr val="accent1"/>
+          </a:effectRef>
+          <a:fontRef idx="minor">
+            <a:schemeClr val="tx1"/>
+          </a:fontRef>
+        </p:style>
+      </p:cxnSp>
+      <p:cxnSp>
+        <p:nvCxnSpPr>
+          <p:cNvPr id="37" name="연결선: 꺾임 36">
+            <a:extLst>
+              <a:ext uri="{FF2B5EF4-FFF2-40B4-BE49-F238E27FC236}">
+                <a16:creationId xmlns:a16="http://schemas.microsoft.com/office/drawing/2014/main" id="{92E380D1-AAE5-60E6-D147-F77E54273A7F}"/>
+              </a:ext>
+            </a:extLst>
+          </p:cNvPr>
+          <p:cNvCxnSpPr>
+            <a:cxnSpLocks/>
+          </p:cNvCxnSpPr>
+          <p:nvPr/>
+        </p:nvCxnSpPr>
+        <p:spPr>
+          <a:xfrm flipV="1">
+            <a:off x="7454544" y="1001482"/>
+            <a:ext cx="296092" cy="261257"/>
+          </a:xfrm>
+          <a:prstGeom prst="bentConnector3">
+            <a:avLst/>
+          </a:prstGeom>
+        </p:spPr>
+        <p:style>
+          <a:lnRef idx="2">
+            <a:schemeClr val="accent1"/>
+          </a:lnRef>
+          <a:fillRef idx="0">
+            <a:schemeClr val="accent1"/>
+          </a:fillRef>
+          <a:effectRef idx="1">
+            <a:schemeClr val="accent1"/>
+          </a:effectRef>
+          <a:fontRef idx="minor">
+            <a:schemeClr val="tx1"/>
+          </a:fontRef>
+        </p:style>
+      </p:cxnSp>
+      <p:cxnSp>
+        <p:nvCxnSpPr>
+          <p:cNvPr id="38" name="연결선: 꺾임 37">
+            <a:extLst>
+              <a:ext uri="{FF2B5EF4-FFF2-40B4-BE49-F238E27FC236}">
+                <a16:creationId xmlns:a16="http://schemas.microsoft.com/office/drawing/2014/main" id="{2978284F-2E3D-4458-5565-BBB79966CE24}"/>
+              </a:ext>
+            </a:extLst>
+          </p:cNvPr>
+          <p:cNvCxnSpPr>
+            <a:cxnSpLocks/>
+          </p:cNvCxnSpPr>
+          <p:nvPr/>
+        </p:nvCxnSpPr>
+        <p:spPr>
+          <a:xfrm>
+            <a:off x="8334114" y="1001484"/>
+            <a:ext cx="296092" cy="261257"/>
+          </a:xfrm>
+          <a:prstGeom prst="bentConnector3">
+            <a:avLst/>
+          </a:prstGeom>
+        </p:spPr>
+        <p:style>
+          <a:lnRef idx="2">
+            <a:schemeClr val="accent1"/>
+          </a:lnRef>
+          <a:fillRef idx="0">
+            <a:schemeClr val="accent1"/>
+          </a:fillRef>
+          <a:effectRef idx="1">
+            <a:schemeClr val="accent1"/>
+          </a:effectRef>
+          <a:fontRef idx="minor">
+            <a:schemeClr val="tx1"/>
+          </a:fontRef>
+        </p:style>
+      </p:cxnSp>
+      <p:cxnSp>
+        <p:nvCxnSpPr>
+          <p:cNvPr id="39" name="연결선: 꺾임 38">
+            <a:extLst>
+              <a:ext uri="{FF2B5EF4-FFF2-40B4-BE49-F238E27FC236}">
+                <a16:creationId xmlns:a16="http://schemas.microsoft.com/office/drawing/2014/main" id="{C1727C07-E17B-DE3C-7D41-97329D2A798B}"/>
+              </a:ext>
+            </a:extLst>
+          </p:cNvPr>
+          <p:cNvCxnSpPr>
+            <a:cxnSpLocks/>
+          </p:cNvCxnSpPr>
+          <p:nvPr/>
+        </p:nvCxnSpPr>
+        <p:spPr>
+          <a:xfrm flipV="1">
+            <a:off x="8038022" y="1001483"/>
+            <a:ext cx="296092" cy="261257"/>
+          </a:xfrm>
+          <a:prstGeom prst="bentConnector3">
+            <a:avLst/>
+          </a:prstGeom>
+        </p:spPr>
+        <p:style>
+          <a:lnRef idx="2">
+            <a:schemeClr val="accent1"/>
+          </a:lnRef>
+          <a:fillRef idx="0">
+            <a:schemeClr val="accent1"/>
+          </a:fillRef>
+          <a:effectRef idx="1">
+            <a:schemeClr val="accent1"/>
+          </a:effectRef>
+          <a:fontRef idx="minor">
+            <a:schemeClr val="tx1"/>
+          </a:fontRef>
+        </p:style>
+      </p:cxnSp>
+      <p:cxnSp>
+        <p:nvCxnSpPr>
+          <p:cNvPr id="40" name="연결선: 꺾임 39">
+            <a:extLst>
+              <a:ext uri="{FF2B5EF4-FFF2-40B4-BE49-F238E27FC236}">
+                <a16:creationId xmlns:a16="http://schemas.microsoft.com/office/drawing/2014/main" id="{5AF83964-43F9-E298-690F-2550D925D0DC}"/>
+              </a:ext>
+            </a:extLst>
+          </p:cNvPr>
+          <p:cNvCxnSpPr>
+            <a:cxnSpLocks/>
+          </p:cNvCxnSpPr>
+          <p:nvPr/>
+        </p:nvCxnSpPr>
+        <p:spPr>
+          <a:xfrm>
+            <a:off x="8908880" y="1001483"/>
+            <a:ext cx="296092" cy="261257"/>
+          </a:xfrm>
+          <a:prstGeom prst="bentConnector3">
+            <a:avLst/>
+          </a:prstGeom>
+        </p:spPr>
+        <p:style>
+          <a:lnRef idx="2">
+            <a:schemeClr val="accent1"/>
+          </a:lnRef>
+          <a:fillRef idx="0">
+            <a:schemeClr val="accent1"/>
+          </a:fillRef>
+          <a:effectRef idx="1">
+            <a:schemeClr val="accent1"/>
+          </a:effectRef>
+          <a:fontRef idx="minor">
+            <a:schemeClr val="tx1"/>
+          </a:fontRef>
+        </p:style>
+      </p:cxnSp>
+      <p:cxnSp>
+        <p:nvCxnSpPr>
+          <p:cNvPr id="41" name="연결선: 꺾임 40">
+            <a:extLst>
+              <a:ext uri="{FF2B5EF4-FFF2-40B4-BE49-F238E27FC236}">
+                <a16:creationId xmlns:a16="http://schemas.microsoft.com/office/drawing/2014/main" id="{A27E454B-4224-E319-100D-3C76B75CEDB8}"/>
+              </a:ext>
+            </a:extLst>
+          </p:cNvPr>
+          <p:cNvCxnSpPr>
+            <a:cxnSpLocks/>
+          </p:cNvCxnSpPr>
+          <p:nvPr/>
+        </p:nvCxnSpPr>
+        <p:spPr>
+          <a:xfrm flipV="1">
+            <a:off x="8621497" y="1001482"/>
+            <a:ext cx="296092" cy="261257"/>
+          </a:xfrm>
+          <a:prstGeom prst="bentConnector3">
+            <a:avLst/>
+          </a:prstGeom>
+        </p:spPr>
+        <p:style>
+          <a:lnRef idx="2">
+            <a:schemeClr val="accent1"/>
+          </a:lnRef>
+          <a:fillRef idx="0">
+            <a:schemeClr val="accent1"/>
+          </a:fillRef>
+          <a:effectRef idx="1">
+            <a:schemeClr val="accent1"/>
+          </a:effectRef>
+          <a:fontRef idx="minor">
+            <a:schemeClr val="tx1"/>
+          </a:fontRef>
+        </p:style>
+      </p:cxnSp>
+      <p:cxnSp>
+        <p:nvCxnSpPr>
+          <p:cNvPr id="42" name="연결선: 꺾임 41">
+            <a:extLst>
+              <a:ext uri="{FF2B5EF4-FFF2-40B4-BE49-F238E27FC236}">
+                <a16:creationId xmlns:a16="http://schemas.microsoft.com/office/drawing/2014/main" id="{6FD0FC72-7809-39B6-84EF-8B7EB389BA08}"/>
+              </a:ext>
+            </a:extLst>
+          </p:cNvPr>
+          <p:cNvCxnSpPr>
+            <a:cxnSpLocks/>
+          </p:cNvCxnSpPr>
+          <p:nvPr/>
+        </p:nvCxnSpPr>
+        <p:spPr>
+          <a:xfrm>
+            <a:off x="9496709" y="1001483"/>
+            <a:ext cx="296092" cy="261257"/>
+          </a:xfrm>
+          <a:prstGeom prst="bentConnector3">
+            <a:avLst/>
+          </a:prstGeom>
+        </p:spPr>
+        <p:style>
+          <a:lnRef idx="2">
+            <a:schemeClr val="accent1"/>
+          </a:lnRef>
+          <a:fillRef idx="0">
+            <a:schemeClr val="accent1"/>
+          </a:fillRef>
+          <a:effectRef idx="1">
+            <a:schemeClr val="accent1"/>
+          </a:effectRef>
+          <a:fontRef idx="minor">
+            <a:schemeClr val="tx1"/>
+          </a:fontRef>
+        </p:style>
+      </p:cxnSp>
+      <p:cxnSp>
+        <p:nvCxnSpPr>
+          <p:cNvPr id="43" name="연결선: 꺾임 42">
+            <a:extLst>
+              <a:ext uri="{FF2B5EF4-FFF2-40B4-BE49-F238E27FC236}">
+                <a16:creationId xmlns:a16="http://schemas.microsoft.com/office/drawing/2014/main" id="{6A1DD032-1270-280C-8D8C-C025E93D82E0}"/>
+              </a:ext>
+            </a:extLst>
+          </p:cNvPr>
+          <p:cNvCxnSpPr>
+            <a:cxnSpLocks/>
+          </p:cNvCxnSpPr>
+          <p:nvPr/>
+        </p:nvCxnSpPr>
+        <p:spPr>
+          <a:xfrm flipV="1">
+            <a:off x="9200617" y="1001482"/>
+            <a:ext cx="296092" cy="261257"/>
+          </a:xfrm>
+          <a:prstGeom prst="bentConnector3">
+            <a:avLst/>
+          </a:prstGeom>
+        </p:spPr>
+        <p:style>
+          <a:lnRef idx="2">
+            <a:schemeClr val="accent1"/>
+          </a:lnRef>
+          <a:fillRef idx="0">
+            <a:schemeClr val="accent1"/>
+          </a:fillRef>
+          <a:effectRef idx="1">
+            <a:schemeClr val="accent1"/>
+          </a:effectRef>
+          <a:fontRef idx="minor">
+            <a:schemeClr val="tx1"/>
+          </a:fontRef>
+        </p:style>
+      </p:cxnSp>
+      <p:cxnSp>
+        <p:nvCxnSpPr>
+          <p:cNvPr id="44" name="연결선: 꺾임 43">
+            <a:extLst>
+              <a:ext uri="{FF2B5EF4-FFF2-40B4-BE49-F238E27FC236}">
+                <a16:creationId xmlns:a16="http://schemas.microsoft.com/office/drawing/2014/main" id="{3F7F066B-F9C7-A50E-B8DD-A7D9D5ECF50A}"/>
+              </a:ext>
+            </a:extLst>
+          </p:cNvPr>
+          <p:cNvCxnSpPr>
+            <a:cxnSpLocks/>
+          </p:cNvCxnSpPr>
+          <p:nvPr/>
+        </p:nvCxnSpPr>
+        <p:spPr>
+          <a:xfrm>
+            <a:off x="10071475" y="1001482"/>
+            <a:ext cx="296092" cy="261257"/>
+          </a:xfrm>
+          <a:prstGeom prst="bentConnector3">
+            <a:avLst/>
+          </a:prstGeom>
+        </p:spPr>
+        <p:style>
+          <a:lnRef idx="2">
+            <a:schemeClr val="accent1"/>
+          </a:lnRef>
+          <a:fillRef idx="0">
+            <a:schemeClr val="accent1"/>
+          </a:fillRef>
+          <a:effectRef idx="1">
+            <a:schemeClr val="accent1"/>
+          </a:effectRef>
+          <a:fontRef idx="minor">
+            <a:schemeClr val="tx1"/>
+          </a:fontRef>
+        </p:style>
+      </p:cxnSp>
+      <p:cxnSp>
+        <p:nvCxnSpPr>
+          <p:cNvPr id="45" name="연결선: 꺾임 44">
+            <a:extLst>
+              <a:ext uri="{FF2B5EF4-FFF2-40B4-BE49-F238E27FC236}">
+                <a16:creationId xmlns:a16="http://schemas.microsoft.com/office/drawing/2014/main" id="{8B5A0424-D77C-85BB-70DC-43C3A2F847C5}"/>
+              </a:ext>
+            </a:extLst>
+          </p:cNvPr>
+          <p:cNvCxnSpPr>
+            <a:cxnSpLocks/>
+          </p:cNvCxnSpPr>
+          <p:nvPr/>
+        </p:nvCxnSpPr>
+        <p:spPr>
+          <a:xfrm flipV="1">
+            <a:off x="9784092" y="1001481"/>
+            <a:ext cx="296092" cy="261257"/>
+          </a:xfrm>
+          <a:prstGeom prst="bentConnector3">
+            <a:avLst/>
+          </a:prstGeom>
+        </p:spPr>
+        <p:style>
+          <a:lnRef idx="2">
+            <a:schemeClr val="accent1"/>
+          </a:lnRef>
+          <a:fillRef idx="0">
+            <a:schemeClr val="accent1"/>
+          </a:fillRef>
+          <a:effectRef idx="1">
+            <a:schemeClr val="accent1"/>
+          </a:effectRef>
+          <a:fontRef idx="minor">
+            <a:schemeClr val="tx1"/>
+          </a:fontRef>
+        </p:style>
+      </p:cxnSp>
+      <p:cxnSp>
+        <p:nvCxnSpPr>
+          <p:cNvPr id="46" name="연결선: 꺾임 45">
+            <a:extLst>
+              <a:ext uri="{FF2B5EF4-FFF2-40B4-BE49-F238E27FC236}">
+                <a16:creationId xmlns:a16="http://schemas.microsoft.com/office/drawing/2014/main" id="{C83305E4-13BA-07A2-D5F1-66E5F4BC469E}"/>
+              </a:ext>
+            </a:extLst>
+          </p:cNvPr>
+          <p:cNvCxnSpPr>
+            <a:cxnSpLocks/>
+          </p:cNvCxnSpPr>
+          <p:nvPr/>
+        </p:nvCxnSpPr>
+        <p:spPr>
+          <a:xfrm>
+            <a:off x="10646243" y="1001482"/>
+            <a:ext cx="296092" cy="261257"/>
+          </a:xfrm>
+          <a:prstGeom prst="bentConnector3">
+            <a:avLst/>
+          </a:prstGeom>
+        </p:spPr>
+        <p:style>
+          <a:lnRef idx="2">
+            <a:schemeClr val="accent1"/>
+          </a:lnRef>
+          <a:fillRef idx="0">
+            <a:schemeClr val="accent1"/>
+          </a:fillRef>
+          <a:effectRef idx="1">
+            <a:schemeClr val="accent1"/>
+          </a:effectRef>
+          <a:fontRef idx="minor">
+            <a:schemeClr val="tx1"/>
+          </a:fontRef>
+        </p:style>
+      </p:cxnSp>
+      <p:cxnSp>
+        <p:nvCxnSpPr>
+          <p:cNvPr id="47" name="연결선: 꺾임 46">
+            <a:extLst>
+              <a:ext uri="{FF2B5EF4-FFF2-40B4-BE49-F238E27FC236}">
+                <a16:creationId xmlns:a16="http://schemas.microsoft.com/office/drawing/2014/main" id="{6AFF5B3B-FA80-250B-E535-A894B5CC2AE5}"/>
+              </a:ext>
+            </a:extLst>
+          </p:cNvPr>
+          <p:cNvCxnSpPr>
+            <a:cxnSpLocks/>
+          </p:cNvCxnSpPr>
+          <p:nvPr/>
+        </p:nvCxnSpPr>
+        <p:spPr>
+          <a:xfrm flipV="1">
+            <a:off x="10350151" y="1001481"/>
+            <a:ext cx="296092" cy="261257"/>
+          </a:xfrm>
+          <a:prstGeom prst="bentConnector3">
+            <a:avLst/>
+          </a:prstGeom>
+        </p:spPr>
+        <p:style>
+          <a:lnRef idx="2">
+            <a:schemeClr val="accent1"/>
+          </a:lnRef>
+          <a:fillRef idx="0">
+            <a:schemeClr val="accent1"/>
+          </a:fillRef>
+          <a:effectRef idx="1">
+            <a:schemeClr val="accent1"/>
+          </a:effectRef>
+          <a:fontRef idx="minor">
+            <a:schemeClr val="tx1"/>
+          </a:fontRef>
+        </p:style>
+      </p:cxnSp>
+      <p:cxnSp>
+        <p:nvCxnSpPr>
+          <p:cNvPr id="48" name="연결선: 꺾임 47">
+            <a:extLst>
+              <a:ext uri="{FF2B5EF4-FFF2-40B4-BE49-F238E27FC236}">
+                <a16:creationId xmlns:a16="http://schemas.microsoft.com/office/drawing/2014/main" id="{13206CD5-8541-E9CD-68A3-C25D009BFC43}"/>
+              </a:ext>
+            </a:extLst>
+          </p:cNvPr>
+          <p:cNvCxnSpPr>
+            <a:cxnSpLocks/>
+          </p:cNvCxnSpPr>
+          <p:nvPr/>
+        </p:nvCxnSpPr>
+        <p:spPr>
+          <a:xfrm>
+            <a:off x="11221009" y="1001481"/>
+            <a:ext cx="296092" cy="261257"/>
+          </a:xfrm>
+          <a:prstGeom prst="bentConnector3">
+            <a:avLst/>
+          </a:prstGeom>
+        </p:spPr>
+        <p:style>
+          <a:lnRef idx="2">
+            <a:schemeClr val="accent1"/>
+          </a:lnRef>
+          <a:fillRef idx="0">
+            <a:schemeClr val="accent1"/>
+          </a:fillRef>
+          <a:effectRef idx="1">
+            <a:schemeClr val="accent1"/>
+          </a:effectRef>
+          <a:fontRef idx="minor">
+            <a:schemeClr val="tx1"/>
+          </a:fontRef>
+        </p:style>
+      </p:cxnSp>
+      <p:cxnSp>
+        <p:nvCxnSpPr>
+          <p:cNvPr id="49" name="연결선: 꺾임 48">
+            <a:extLst>
+              <a:ext uri="{FF2B5EF4-FFF2-40B4-BE49-F238E27FC236}">
+                <a16:creationId xmlns:a16="http://schemas.microsoft.com/office/drawing/2014/main" id="{D901FB8A-6F11-3310-C7CC-7C13371DBC69}"/>
+              </a:ext>
+            </a:extLst>
+          </p:cNvPr>
+          <p:cNvCxnSpPr>
+            <a:cxnSpLocks/>
+          </p:cNvCxnSpPr>
+          <p:nvPr/>
+        </p:nvCxnSpPr>
+        <p:spPr>
+          <a:xfrm flipV="1">
+            <a:off x="10933626" y="1001480"/>
+            <a:ext cx="296092" cy="261257"/>
+          </a:xfrm>
+          <a:prstGeom prst="bentConnector3">
+            <a:avLst/>
+          </a:prstGeom>
+        </p:spPr>
+        <p:style>
+          <a:lnRef idx="2">
+            <a:schemeClr val="accent1"/>
+          </a:lnRef>
+          <a:fillRef idx="0">
+            <a:schemeClr val="accent1"/>
+          </a:fillRef>
+          <a:effectRef idx="1">
+            <a:schemeClr val="accent1"/>
+          </a:effectRef>
+          <a:fontRef idx="minor">
+            <a:schemeClr val="tx1"/>
+          </a:fontRef>
+        </p:style>
+      </p:cxnSp>
+      <p:sp>
+        <p:nvSpPr>
+          <p:cNvPr id="130" name="직사각형 129">
+            <a:extLst>
+              <a:ext uri="{FF2B5EF4-FFF2-40B4-BE49-F238E27FC236}">
+                <a16:creationId xmlns:a16="http://schemas.microsoft.com/office/drawing/2014/main" id="{4B4C56CB-1082-2941-1CF2-062ADB9A8900}"/>
+              </a:ext>
+            </a:extLst>
+          </p:cNvPr>
+          <p:cNvSpPr/>
+          <p:nvPr/>
+        </p:nvSpPr>
+        <p:spPr>
+          <a:xfrm>
+            <a:off x="313509" y="1001479"/>
+            <a:ext cx="740225" cy="261257"/>
+          </a:xfrm>
+          <a:prstGeom prst="rect">
+            <a:avLst/>
+          </a:prstGeom>
+        </p:spPr>
+        <p:style>
+          <a:lnRef idx="1">
+            <a:schemeClr val="accent1"/>
+          </a:lnRef>
+          <a:fillRef idx="2">
+            <a:schemeClr val="accent1"/>
+          </a:fillRef>
+          <a:effectRef idx="1">
+            <a:schemeClr val="accent1"/>
+          </a:effectRef>
+          <a:fontRef idx="minor">
+            <a:schemeClr val="dk1"/>
+          </a:fontRef>
+        </p:style>
+        <p:txBody>
+          <a:bodyPr rtlCol="0" anchor="ctr"/>
+          <a:lstStyle/>
+          <a:p>
+            <a:pPr algn="ctr"/>
+            <a:r>
+              <a:rPr lang="en-US" altLang="ko-KR" b="1" dirty="0"/>
+              <a:t>SCLK</a:t>
+            </a:r>
+            <a:endParaRPr lang="ko-KR" altLang="en-US" b="1" dirty="0"/>
+          </a:p>
+        </p:txBody>
+      </p:sp>
+      <p:sp>
+        <p:nvSpPr>
+          <p:cNvPr id="131" name="직사각형 130">
+            <a:extLst>
+              <a:ext uri="{FF2B5EF4-FFF2-40B4-BE49-F238E27FC236}">
+                <a16:creationId xmlns:a16="http://schemas.microsoft.com/office/drawing/2014/main" id="{57C2A235-BEBC-8B00-8B5D-296CDE880B84}"/>
+              </a:ext>
+            </a:extLst>
+          </p:cNvPr>
+          <p:cNvSpPr/>
+          <p:nvPr/>
+        </p:nvSpPr>
+        <p:spPr>
+          <a:xfrm>
+            <a:off x="326573" y="1571890"/>
+            <a:ext cx="740225" cy="261257"/>
+          </a:xfrm>
+          <a:prstGeom prst="rect">
+            <a:avLst/>
+          </a:prstGeom>
+        </p:spPr>
+        <p:style>
+          <a:lnRef idx="1">
+            <a:schemeClr val="accent1"/>
+          </a:lnRef>
+          <a:fillRef idx="2">
+            <a:schemeClr val="accent1"/>
+          </a:fillRef>
+          <a:effectRef idx="1">
+            <a:schemeClr val="accent1"/>
+          </a:effectRef>
+          <a:fontRef idx="minor">
+            <a:schemeClr val="dk1"/>
+          </a:fontRef>
+        </p:style>
+        <p:txBody>
+          <a:bodyPr rtlCol="0" anchor="ctr"/>
+          <a:lstStyle/>
+          <a:p>
+            <a:pPr algn="ctr"/>
+            <a:r>
+              <a:rPr lang="en-US" altLang="ko-KR" sz="1600" b="1" dirty="0"/>
+              <a:t>MOSI</a:t>
+            </a:r>
+            <a:endParaRPr lang="ko-KR" altLang="en-US" sz="1600" b="1" dirty="0"/>
+          </a:p>
+        </p:txBody>
+      </p:sp>
+      <p:sp>
+        <p:nvSpPr>
+          <p:cNvPr id="132" name="직사각형 131">
+            <a:extLst>
+              <a:ext uri="{FF2B5EF4-FFF2-40B4-BE49-F238E27FC236}">
+                <a16:creationId xmlns:a16="http://schemas.microsoft.com/office/drawing/2014/main" id="{10B94BBA-5A7D-2378-8197-D34798E2E187}"/>
+              </a:ext>
+            </a:extLst>
+          </p:cNvPr>
+          <p:cNvSpPr/>
+          <p:nvPr/>
+        </p:nvSpPr>
+        <p:spPr>
+          <a:xfrm>
+            <a:off x="326573" y="2142294"/>
+            <a:ext cx="740225" cy="261257"/>
+          </a:xfrm>
+          <a:prstGeom prst="rect">
+            <a:avLst/>
+          </a:prstGeom>
+        </p:spPr>
+        <p:style>
+          <a:lnRef idx="1">
+            <a:schemeClr val="accent1"/>
+          </a:lnRef>
+          <a:fillRef idx="2">
+            <a:schemeClr val="accent1"/>
+          </a:fillRef>
+          <a:effectRef idx="1">
+            <a:schemeClr val="accent1"/>
+          </a:effectRef>
+          <a:fontRef idx="minor">
+            <a:schemeClr val="dk1"/>
+          </a:fontRef>
+        </p:style>
+        <p:txBody>
+          <a:bodyPr rtlCol="0" anchor="ctr"/>
+          <a:lstStyle/>
+          <a:p>
+            <a:pPr algn="ctr"/>
+            <a:r>
+              <a:rPr lang="en-US" altLang="ko-KR" sz="1600" b="1" dirty="0"/>
+              <a:t>MISO</a:t>
+            </a:r>
+            <a:endParaRPr lang="ko-KR" altLang="en-US" sz="1600" b="1" dirty="0"/>
+          </a:p>
+        </p:txBody>
+      </p:sp>
+      <p:sp>
+        <p:nvSpPr>
+          <p:cNvPr id="133" name="직사각형 132">
+            <a:extLst>
+              <a:ext uri="{FF2B5EF4-FFF2-40B4-BE49-F238E27FC236}">
+                <a16:creationId xmlns:a16="http://schemas.microsoft.com/office/drawing/2014/main" id="{459E5FE2-AC9B-E6ED-0F55-64E2212E51D8}"/>
+              </a:ext>
+            </a:extLst>
+          </p:cNvPr>
+          <p:cNvSpPr/>
+          <p:nvPr/>
+        </p:nvSpPr>
+        <p:spPr>
+          <a:xfrm>
+            <a:off x="326573" y="2712698"/>
+            <a:ext cx="740225" cy="261257"/>
+          </a:xfrm>
+          <a:prstGeom prst="rect">
+            <a:avLst/>
+          </a:prstGeom>
+        </p:spPr>
+        <p:style>
+          <a:lnRef idx="1">
+            <a:schemeClr val="accent1"/>
+          </a:lnRef>
+          <a:fillRef idx="2">
+            <a:schemeClr val="accent1"/>
+          </a:fillRef>
+          <a:effectRef idx="1">
+            <a:schemeClr val="accent1"/>
+          </a:effectRef>
+          <a:fontRef idx="minor">
+            <a:schemeClr val="dk1"/>
+          </a:fontRef>
+        </p:style>
+        <p:txBody>
+          <a:bodyPr rtlCol="0" anchor="ctr"/>
+          <a:lstStyle/>
+          <a:p>
+            <a:pPr algn="ctr"/>
+            <a:r>
+              <a:rPr lang="en-US" altLang="ko-KR" b="1" dirty="0"/>
+              <a:t>SS</a:t>
+            </a:r>
+            <a:endParaRPr lang="ko-KR" altLang="en-US" b="1" dirty="0"/>
+          </a:p>
+        </p:txBody>
+      </p:sp>
+      <p:sp>
+        <p:nvSpPr>
+          <p:cNvPr id="134" name="직사각형 133">
+            <a:extLst>
+              <a:ext uri="{FF2B5EF4-FFF2-40B4-BE49-F238E27FC236}">
+                <a16:creationId xmlns:a16="http://schemas.microsoft.com/office/drawing/2014/main" id="{46025DE7-AF26-4422-91CB-E241C3D6033B}"/>
+              </a:ext>
+            </a:extLst>
+          </p:cNvPr>
+          <p:cNvSpPr/>
+          <p:nvPr/>
+        </p:nvSpPr>
+        <p:spPr>
+          <a:xfrm>
+            <a:off x="326573" y="3283102"/>
+            <a:ext cx="740225" cy="261257"/>
+          </a:xfrm>
+          <a:prstGeom prst="rect">
+            <a:avLst/>
+          </a:prstGeom>
+        </p:spPr>
+        <p:style>
+          <a:lnRef idx="1">
+            <a:schemeClr val="accent1"/>
+          </a:lnRef>
+          <a:fillRef idx="2">
+            <a:schemeClr val="accent1"/>
+          </a:fillRef>
+          <a:effectRef idx="1">
+            <a:schemeClr val="accent1"/>
+          </a:effectRef>
+          <a:fontRef idx="minor">
+            <a:schemeClr val="dk1"/>
+          </a:fontRef>
+        </p:style>
+        <p:txBody>
+          <a:bodyPr rtlCol="0" anchor="ctr"/>
+          <a:lstStyle/>
+          <a:p>
+            <a:pPr algn="ctr"/>
+            <a:r>
+              <a:rPr lang="en-US" altLang="ko-KR" b="1" dirty="0" err="1"/>
+              <a:t>tx</a:t>
+            </a:r>
+            <a:endParaRPr lang="ko-KR" altLang="en-US" b="1" dirty="0"/>
+          </a:p>
+        </p:txBody>
+      </p:sp>
+      <p:sp>
+        <p:nvSpPr>
+          <p:cNvPr id="135" name="직사각형 134">
+            <a:extLst>
+              <a:ext uri="{FF2B5EF4-FFF2-40B4-BE49-F238E27FC236}">
+                <a16:creationId xmlns:a16="http://schemas.microsoft.com/office/drawing/2014/main" id="{ADD1984F-FB5B-4829-E90A-0B43362CA696}"/>
+              </a:ext>
+            </a:extLst>
+          </p:cNvPr>
+          <p:cNvSpPr/>
+          <p:nvPr/>
+        </p:nvSpPr>
+        <p:spPr>
+          <a:xfrm>
+            <a:off x="326572" y="3853506"/>
+            <a:ext cx="740225" cy="261257"/>
+          </a:xfrm>
+          <a:prstGeom prst="rect">
+            <a:avLst/>
+          </a:prstGeom>
+        </p:spPr>
+        <p:style>
+          <a:lnRef idx="1">
+            <a:schemeClr val="accent1"/>
+          </a:lnRef>
+          <a:fillRef idx="2">
+            <a:schemeClr val="accent1"/>
+          </a:fillRef>
+          <a:effectRef idx="1">
+            <a:schemeClr val="accent1"/>
+          </a:effectRef>
+          <a:fontRef idx="minor">
+            <a:schemeClr val="dk1"/>
+          </a:fontRef>
+        </p:style>
+        <p:txBody>
+          <a:bodyPr rtlCol="0" anchor="ctr"/>
+          <a:lstStyle/>
+          <a:p>
+            <a:pPr algn="ctr"/>
+            <a:r>
+              <a:rPr lang="en-US" altLang="ko-KR" b="1" dirty="0" err="1"/>
+              <a:t>rx</a:t>
+            </a:r>
+            <a:endParaRPr lang="ko-KR" altLang="en-US" b="1" dirty="0"/>
+          </a:p>
+        </p:txBody>
+      </p:sp>
+      <p:sp>
+        <p:nvSpPr>
+          <p:cNvPr id="136" name="직사각형 135">
+            <a:extLst>
+              <a:ext uri="{FF2B5EF4-FFF2-40B4-BE49-F238E27FC236}">
+                <a16:creationId xmlns:a16="http://schemas.microsoft.com/office/drawing/2014/main" id="{3D1D3856-EC3A-BC50-2605-67C6998E8B08}"/>
+              </a:ext>
+            </a:extLst>
+          </p:cNvPr>
+          <p:cNvSpPr/>
+          <p:nvPr/>
+        </p:nvSpPr>
+        <p:spPr>
+          <a:xfrm>
+            <a:off x="326572" y="4423910"/>
+            <a:ext cx="740225" cy="261257"/>
+          </a:xfrm>
+          <a:prstGeom prst="rect">
+            <a:avLst/>
+          </a:prstGeom>
+        </p:spPr>
+        <p:style>
+          <a:lnRef idx="1">
+            <a:schemeClr val="accent1"/>
+          </a:lnRef>
+          <a:fillRef idx="2">
+            <a:schemeClr val="accent1"/>
+          </a:fillRef>
+          <a:effectRef idx="1">
+            <a:schemeClr val="accent1"/>
+          </a:effectRef>
+          <a:fontRef idx="minor">
+            <a:schemeClr val="dk1"/>
+          </a:fontRef>
+        </p:style>
+        <p:txBody>
+          <a:bodyPr rtlCol="0" anchor="ctr"/>
+          <a:lstStyle/>
+          <a:p>
+            <a:pPr algn="ctr"/>
+            <a:r>
+              <a:rPr lang="en-US" altLang="ko-KR" b="1" dirty="0"/>
+              <a:t>RD</a:t>
+            </a:r>
+            <a:endParaRPr lang="ko-KR" altLang="en-US" b="1" dirty="0"/>
+          </a:p>
+        </p:txBody>
+      </p:sp>
+    </p:spTree>
+    <p:extLst>
+      <p:ext uri="{BB962C8B-B14F-4D97-AF65-F5344CB8AC3E}">
+        <p14:creationId xmlns:p14="http://schemas.microsoft.com/office/powerpoint/2010/main" val="1500771509"/>
       </p:ext>
     </p:extLst>
   </p:cSld>

</xml_diff>

<commit_message>
modified:   dev/fpga/fpga_only_controller/Memory.v 	modified:   dev/fpga/fpga_only_controller/controller_16bit.v 	modified:   dev/fpga/fpga_only_controller/spi_short_module.v 	modified:   dev/fpga/fpgad.v 	modified:   "dev/fpga/\355\206\265\354\213\240\352\265\254\354\241\260\352\265\254\354\203\201\353\217\204/\355\206\265\354\213\240\352\265\254\354\241\260.pptx"
</commit_message>
<xml_diff>
--- a/dev/fpga/통신구조구상도/통신구조.pptx
+++ b/dev/fpga/통신구조구상도/통신구조.pptx
@@ -261,7 +261,7 @@
           <a:p>
             <a:fld id="{F14D9079-434D-4AD0-BECB-31635DDC2C1D}" type="datetimeFigureOut">
               <a:rPr lang="ko-KR" altLang="en-US" smtClean="0"/>
-              <a:t>2024-03-28</a:t>
+              <a:t>2024-03-29</a:t>
             </a:fld>
             <a:endParaRPr lang="ko-KR" altLang="en-US"/>
           </a:p>
@@ -459,7 +459,7 @@
           <a:p>
             <a:fld id="{F14D9079-434D-4AD0-BECB-31635DDC2C1D}" type="datetimeFigureOut">
               <a:rPr lang="ko-KR" altLang="en-US" smtClean="0"/>
-              <a:t>2024-03-28</a:t>
+              <a:t>2024-03-29</a:t>
             </a:fld>
             <a:endParaRPr lang="ko-KR" altLang="en-US"/>
           </a:p>
@@ -667,7 +667,7 @@
           <a:p>
             <a:fld id="{F14D9079-434D-4AD0-BECB-31635DDC2C1D}" type="datetimeFigureOut">
               <a:rPr lang="ko-KR" altLang="en-US" smtClean="0"/>
-              <a:t>2024-03-28</a:t>
+              <a:t>2024-03-29</a:t>
             </a:fld>
             <a:endParaRPr lang="ko-KR" altLang="en-US"/>
           </a:p>
@@ -865,7 +865,7 @@
           <a:p>
             <a:fld id="{F14D9079-434D-4AD0-BECB-31635DDC2C1D}" type="datetimeFigureOut">
               <a:rPr lang="ko-KR" altLang="en-US" smtClean="0"/>
-              <a:t>2024-03-28</a:t>
+              <a:t>2024-03-29</a:t>
             </a:fld>
             <a:endParaRPr lang="ko-KR" altLang="en-US"/>
           </a:p>
@@ -1140,7 +1140,7 @@
           <a:p>
             <a:fld id="{F14D9079-434D-4AD0-BECB-31635DDC2C1D}" type="datetimeFigureOut">
               <a:rPr lang="ko-KR" altLang="en-US" smtClean="0"/>
-              <a:t>2024-03-28</a:t>
+              <a:t>2024-03-29</a:t>
             </a:fld>
             <a:endParaRPr lang="ko-KR" altLang="en-US"/>
           </a:p>
@@ -1405,7 +1405,7 @@
           <a:p>
             <a:fld id="{F14D9079-434D-4AD0-BECB-31635DDC2C1D}" type="datetimeFigureOut">
               <a:rPr lang="ko-KR" altLang="en-US" smtClean="0"/>
-              <a:t>2024-03-28</a:t>
+              <a:t>2024-03-29</a:t>
             </a:fld>
             <a:endParaRPr lang="ko-KR" altLang="en-US"/>
           </a:p>
@@ -1817,7 +1817,7 @@
           <a:p>
             <a:fld id="{F14D9079-434D-4AD0-BECB-31635DDC2C1D}" type="datetimeFigureOut">
               <a:rPr lang="ko-KR" altLang="en-US" smtClean="0"/>
-              <a:t>2024-03-28</a:t>
+              <a:t>2024-03-29</a:t>
             </a:fld>
             <a:endParaRPr lang="ko-KR" altLang="en-US"/>
           </a:p>
@@ -1958,7 +1958,7 @@
           <a:p>
             <a:fld id="{F14D9079-434D-4AD0-BECB-31635DDC2C1D}" type="datetimeFigureOut">
               <a:rPr lang="ko-KR" altLang="en-US" smtClean="0"/>
-              <a:t>2024-03-28</a:t>
+              <a:t>2024-03-29</a:t>
             </a:fld>
             <a:endParaRPr lang="ko-KR" altLang="en-US"/>
           </a:p>
@@ -2071,7 +2071,7 @@
           <a:p>
             <a:fld id="{F14D9079-434D-4AD0-BECB-31635DDC2C1D}" type="datetimeFigureOut">
               <a:rPr lang="ko-KR" altLang="en-US" smtClean="0"/>
-              <a:t>2024-03-28</a:t>
+              <a:t>2024-03-29</a:t>
             </a:fld>
             <a:endParaRPr lang="ko-KR" altLang="en-US"/>
           </a:p>
@@ -2382,7 +2382,7 @@
           <a:p>
             <a:fld id="{F14D9079-434D-4AD0-BECB-31635DDC2C1D}" type="datetimeFigureOut">
               <a:rPr lang="ko-KR" altLang="en-US" smtClean="0"/>
-              <a:t>2024-03-28</a:t>
+              <a:t>2024-03-29</a:t>
             </a:fld>
             <a:endParaRPr lang="ko-KR" altLang="en-US"/>
           </a:p>
@@ -2670,7 +2670,7 @@
           <a:p>
             <a:fld id="{F14D9079-434D-4AD0-BECB-31635DDC2C1D}" type="datetimeFigureOut">
               <a:rPr lang="ko-KR" altLang="en-US" smtClean="0"/>
-              <a:t>2024-03-28</a:t>
+              <a:t>2024-03-29</a:t>
             </a:fld>
             <a:endParaRPr lang="ko-KR" altLang="en-US"/>
           </a:p>
@@ -2911,7 +2911,7 @@
           <a:p>
             <a:fld id="{F14D9079-434D-4AD0-BECB-31635DDC2C1D}" type="datetimeFigureOut">
               <a:rPr lang="ko-KR" altLang="en-US" smtClean="0"/>
-              <a:t>2024-03-28</a:t>
+              <a:t>2024-03-29</a:t>
             </a:fld>
             <a:endParaRPr lang="ko-KR" altLang="en-US"/>
           </a:p>

</xml_diff>

<commit_message>
modified:   dev/fpga/fpga_only_controller/Memory.v 	modified:   dev/fpga/fpga_only_controller/controller.bsf 	modified:   dev/fpga/fpga_only_controller/controller_16bit.v 	modified:   dev/fpga/fpga_only_controller/counter_16bit.v 	modified:   dev/fpga/fpga_only_controller/fpga_only_controller.bdf 	modified:   dev/fpga/fpga_only_controller/spi_short_module.v 	new file:   dev/fpga/fpga_only_controller_list 	new file:   dev/fpga/fpga_only_controller_waveform.wlf 	modified:   dev/fpga/fpgad.v 	modified:   "dev/fpga/\355\206\265\354\213\240\352\265\254\354\241\260\352\265\254\354\203\201\353\217\204/\355\206\265\354\213\240\352\265\254\354\241\260.pptx"
The FPGA code has been finalized, But The USB functionality has not been implemented.
</commit_message>
<xml_diff>
--- a/dev/fpga/통신구조구상도/통신구조.pptx
+++ b/dev/fpga/통신구조구상도/통신구조.pptx
@@ -261,7 +261,7 @@
           <a:p>
             <a:fld id="{F14D9079-434D-4AD0-BECB-31635DDC2C1D}" type="datetimeFigureOut">
               <a:rPr lang="ko-KR" altLang="en-US" smtClean="0"/>
-              <a:t>2024-03-29</a:t>
+              <a:t>2024-03-31</a:t>
             </a:fld>
             <a:endParaRPr lang="ko-KR" altLang="en-US"/>
           </a:p>
@@ -459,7 +459,7 @@
           <a:p>
             <a:fld id="{F14D9079-434D-4AD0-BECB-31635DDC2C1D}" type="datetimeFigureOut">
               <a:rPr lang="ko-KR" altLang="en-US" smtClean="0"/>
-              <a:t>2024-03-29</a:t>
+              <a:t>2024-03-31</a:t>
             </a:fld>
             <a:endParaRPr lang="ko-KR" altLang="en-US"/>
           </a:p>
@@ -667,7 +667,7 @@
           <a:p>
             <a:fld id="{F14D9079-434D-4AD0-BECB-31635DDC2C1D}" type="datetimeFigureOut">
               <a:rPr lang="ko-KR" altLang="en-US" smtClean="0"/>
-              <a:t>2024-03-29</a:t>
+              <a:t>2024-03-31</a:t>
             </a:fld>
             <a:endParaRPr lang="ko-KR" altLang="en-US"/>
           </a:p>
@@ -865,7 +865,7 @@
           <a:p>
             <a:fld id="{F14D9079-434D-4AD0-BECB-31635DDC2C1D}" type="datetimeFigureOut">
               <a:rPr lang="ko-KR" altLang="en-US" smtClean="0"/>
-              <a:t>2024-03-29</a:t>
+              <a:t>2024-03-31</a:t>
             </a:fld>
             <a:endParaRPr lang="ko-KR" altLang="en-US"/>
           </a:p>
@@ -1140,7 +1140,7 @@
           <a:p>
             <a:fld id="{F14D9079-434D-4AD0-BECB-31635DDC2C1D}" type="datetimeFigureOut">
               <a:rPr lang="ko-KR" altLang="en-US" smtClean="0"/>
-              <a:t>2024-03-29</a:t>
+              <a:t>2024-03-31</a:t>
             </a:fld>
             <a:endParaRPr lang="ko-KR" altLang="en-US"/>
           </a:p>
@@ -1405,7 +1405,7 @@
           <a:p>
             <a:fld id="{F14D9079-434D-4AD0-BECB-31635DDC2C1D}" type="datetimeFigureOut">
               <a:rPr lang="ko-KR" altLang="en-US" smtClean="0"/>
-              <a:t>2024-03-29</a:t>
+              <a:t>2024-03-31</a:t>
             </a:fld>
             <a:endParaRPr lang="ko-KR" altLang="en-US"/>
           </a:p>
@@ -1817,7 +1817,7 @@
           <a:p>
             <a:fld id="{F14D9079-434D-4AD0-BECB-31635DDC2C1D}" type="datetimeFigureOut">
               <a:rPr lang="ko-KR" altLang="en-US" smtClean="0"/>
-              <a:t>2024-03-29</a:t>
+              <a:t>2024-03-31</a:t>
             </a:fld>
             <a:endParaRPr lang="ko-KR" altLang="en-US"/>
           </a:p>
@@ -1958,7 +1958,7 @@
           <a:p>
             <a:fld id="{F14D9079-434D-4AD0-BECB-31635DDC2C1D}" type="datetimeFigureOut">
               <a:rPr lang="ko-KR" altLang="en-US" smtClean="0"/>
-              <a:t>2024-03-29</a:t>
+              <a:t>2024-03-31</a:t>
             </a:fld>
             <a:endParaRPr lang="ko-KR" altLang="en-US"/>
           </a:p>
@@ -2071,7 +2071,7 @@
           <a:p>
             <a:fld id="{F14D9079-434D-4AD0-BECB-31635DDC2C1D}" type="datetimeFigureOut">
               <a:rPr lang="ko-KR" altLang="en-US" smtClean="0"/>
-              <a:t>2024-03-29</a:t>
+              <a:t>2024-03-31</a:t>
             </a:fld>
             <a:endParaRPr lang="ko-KR" altLang="en-US"/>
           </a:p>
@@ -2382,7 +2382,7 @@
           <a:p>
             <a:fld id="{F14D9079-434D-4AD0-BECB-31635DDC2C1D}" type="datetimeFigureOut">
               <a:rPr lang="ko-KR" altLang="en-US" smtClean="0"/>
-              <a:t>2024-03-29</a:t>
+              <a:t>2024-03-31</a:t>
             </a:fld>
             <a:endParaRPr lang="ko-KR" altLang="en-US"/>
           </a:p>
@@ -2670,7 +2670,7 @@
           <a:p>
             <a:fld id="{F14D9079-434D-4AD0-BECB-31635DDC2C1D}" type="datetimeFigureOut">
               <a:rPr lang="ko-KR" altLang="en-US" smtClean="0"/>
-              <a:t>2024-03-29</a:t>
+              <a:t>2024-03-31</a:t>
             </a:fld>
             <a:endParaRPr lang="ko-KR" altLang="en-US"/>
           </a:p>
@@ -2911,7 +2911,7 @@
           <a:p>
             <a:fld id="{F14D9079-434D-4AD0-BECB-31635DDC2C1D}" type="datetimeFigureOut">
               <a:rPr lang="ko-KR" altLang="en-US" smtClean="0"/>
-              <a:t>2024-03-29</a:t>
+              <a:t>2024-03-31</a:t>
             </a:fld>
             <a:endParaRPr lang="ko-KR" altLang="en-US"/>
           </a:p>
@@ -4336,7 +4336,7 @@
             </a:r>
             <a:r>
               <a:rPr lang="en-US" altLang="ko-KR" dirty="0"/>
-              <a:t> = 2 </a:t>
+              <a:t> = 0 </a:t>
             </a:r>
             <a:r>
               <a:rPr lang="ko-KR" altLang="en-US" dirty="0" err="1"/>
@@ -4374,7 +4374,7 @@
             </a:r>
             <a:r>
               <a:rPr lang="en-US" altLang="ko-KR" dirty="0"/>
-              <a:t>=2 </a:t>
+              <a:t>=0 </a:t>
             </a:r>
             <a:r>
               <a:rPr lang="ko-KR" altLang="en-US" dirty="0"/>

</xml_diff>

<commit_message>
modified:   "dev/fpga/\355\206\265\354\213\240\352\265\254\354\241\260\352\265\254\354\203\201\353\217\204/\355\206\265\354\213\240\352\265\254\354\241\260.pptx" 	deleted:    dev/fpga/test_counter.cr.mti 	deleted:    dev/fpga/test_counter.mpf
</commit_message>
<xml_diff>
--- a/dev/fpga/통신구조구상도/통신구조.pptx
+++ b/dev/fpga/통신구조구상도/통신구조.pptx
@@ -4404,7 +4404,7 @@
             </a:r>
             <a:r>
               <a:rPr lang="en-US" altLang="ko-KR" dirty="0"/>
-              <a:t> = 2 Data</a:t>
+              <a:t> = 3 Data</a:t>
             </a:r>
             <a:r>
               <a:rPr lang="ko-KR" altLang="en-US" dirty="0"/>
@@ -4557,10 +4557,16 @@
               <a:t>rx</a:t>
             </a:r>
             <a:r>
+              <a:rPr lang="en-US" altLang="ko-KR">
+                <a:sym typeface="Wingdings" panose="05000000000000000000" pitchFamily="2" charset="2"/>
+              </a:rPr>
+              <a:t>= 3 </a:t>
+            </a:r>
+            <a:r>
               <a:rPr lang="en-US" altLang="ko-KR" dirty="0">
                 <a:sym typeface="Wingdings" panose="05000000000000000000" pitchFamily="2" charset="2"/>
               </a:rPr>
-              <a:t>= 2 Data</a:t>
+              <a:t>Data</a:t>
             </a:r>
             <a:r>
               <a:rPr lang="ko-KR" altLang="en-US" dirty="0">

</xml_diff>